<commit_message>
finished training code and presentation. Added execise folder
</commit_message>
<xml_diff>
--- a/Presentation/Design Patterns Official.pptx
+++ b/Presentation/Design Patterns Official.pptx
@@ -12,16 +12,18 @@
     <p:sldId id="285" r:id="rId6"/>
     <p:sldId id="273" r:id="rId7"/>
     <p:sldId id="274" r:id="rId8"/>
-    <p:sldId id="275" r:id="rId9"/>
-    <p:sldId id="278" r:id="rId10"/>
+    <p:sldId id="278" r:id="rId9"/>
+    <p:sldId id="287" r:id="rId10"/>
     <p:sldId id="276" r:id="rId11"/>
-    <p:sldId id="286" r:id="rId12"/>
-    <p:sldId id="277" r:id="rId13"/>
-    <p:sldId id="270" r:id="rId14"/>
-    <p:sldId id="283" r:id="rId15"/>
-    <p:sldId id="284" r:id="rId16"/>
-    <p:sldId id="281" r:id="rId17"/>
-    <p:sldId id="280" r:id="rId18"/>
+    <p:sldId id="288" r:id="rId12"/>
+    <p:sldId id="286" r:id="rId13"/>
+    <p:sldId id="289" r:id="rId14"/>
+    <p:sldId id="290" r:id="rId15"/>
+    <p:sldId id="270" r:id="rId16"/>
+    <p:sldId id="283" r:id="rId17"/>
+    <p:sldId id="284" r:id="rId18"/>
+    <p:sldId id="281" r:id="rId19"/>
+    <p:sldId id="280" r:id="rId20"/>
   </p:sldIdLst>
   <p:sldSz cx="9144000" cy="5143500" type="screen16x9"/>
   <p:notesSz cx="6858000" cy="9144000"/>
@@ -5930,8 +5932,12 @@
           <a:lstStyle/>
           <a:p>
             <a:r>
-              <a:rPr lang="en-US" dirty="0"/>
-              <a:t>Design Patterns</a:t>
+              <a:rPr lang="en-US" sz="1800" dirty="0"/>
+              <a:t>Some</a:t>
+            </a:r>
+            <a:r>
+              <a:rPr lang="en-US" dirty="0"/>
+              <a:t> Design Patterns</a:t>
             </a:r>
           </a:p>
         </p:txBody>
@@ -6083,18 +6089,71 @@
             <p:ph type="body" sz="quarter" idx="10"/>
           </p:nvPr>
         </p:nvSpPr>
-        <p:spPr/>
+        <p:spPr>
+          <a:xfrm>
+            <a:off x="374650" y="834338"/>
+            <a:ext cx="8382000" cy="426823"/>
+          </a:xfrm>
+        </p:spPr>
         <p:txBody>
           <a:bodyPr/>
           <a:lstStyle/>
           <a:p>
             <a:r>
-              <a:rPr lang="en-US" dirty="0"/>
-              <a:t>Extends objects functionality</a:t>
-            </a:r>
-          </a:p>
-        </p:txBody>
-      </p:sp>
+              <a:rPr lang="en-US" sz="1800" dirty="0"/>
+              <a:t>Extends (decorates) an object’s functionality</a:t>
+            </a:r>
+          </a:p>
+        </p:txBody>
+      </p:sp>
+      <p:pic>
+        <p:nvPicPr>
+          <p:cNvPr id="8" name="Picture 7"/>
+          <p:cNvPicPr>
+            <a:picLocks noChangeAspect="1"/>
+          </p:cNvPicPr>
+          <p:nvPr/>
+        </p:nvPicPr>
+        <p:blipFill>
+          <a:blip r:embed="rId2"/>
+          <a:stretch>
+            <a:fillRect/>
+          </a:stretch>
+        </p:blipFill>
+        <p:spPr>
+          <a:xfrm>
+            <a:off x="4848860" y="1358109"/>
+            <a:ext cx="3614625" cy="2707367"/>
+          </a:xfrm>
+          <a:prstGeom prst="rect">
+            <a:avLst/>
+          </a:prstGeom>
+        </p:spPr>
+      </p:pic>
+      <p:pic>
+        <p:nvPicPr>
+          <p:cNvPr id="9" name="Picture 8"/>
+          <p:cNvPicPr>
+            <a:picLocks noChangeAspect="1"/>
+          </p:cNvPicPr>
+          <p:nvPr/>
+        </p:nvPicPr>
+        <p:blipFill>
+          <a:blip r:embed="rId3"/>
+          <a:stretch>
+            <a:fillRect/>
+          </a:stretch>
+        </p:blipFill>
+        <p:spPr>
+          <a:xfrm>
+            <a:off x="626075" y="1177653"/>
+            <a:ext cx="3520622" cy="3306819"/>
+          </a:xfrm>
+          <a:prstGeom prst="rect">
+            <a:avLst/>
+          </a:prstGeom>
+        </p:spPr>
+      </p:pic>
     </p:spTree>
     <p:extLst>
       <p:ext uri="{BB962C8B-B14F-4D97-AF65-F5344CB8AC3E}">
@@ -6141,41 +6200,206 @@
           <a:lstStyle/>
           <a:p>
             <a:r>
-              <a:rPr lang="en-US" dirty="0"/>
-              <a:t>Observer (behavioral)</a:t>
-            </a:r>
-          </a:p>
-        </p:txBody>
-      </p:sp>
-      <p:sp>
-        <p:nvSpPr>
-          <p:cNvPr id="3" name="Text Placeholder 2"/>
-          <p:cNvSpPr>
-            <a:spLocks noGrp="1"/>
-          </p:cNvSpPr>
-          <p:nvPr>
-            <p:ph type="body" sz="quarter" idx="10"/>
-          </p:nvPr>
-        </p:nvSpPr>
-        <p:spPr/>
-        <p:txBody>
-          <a:bodyPr/>
-          <a:lstStyle/>
-          <a:p>
-            <a:endParaRPr lang="en-US"/>
-          </a:p>
-        </p:txBody>
-      </p:sp>
+              <a:rPr lang="en-CA" dirty="0"/>
+              <a:t>Decorator vs. Inheritance – what’s better?</a:t>
+            </a:r>
+          </a:p>
+        </p:txBody>
+      </p:sp>
+      <p:pic>
+        <p:nvPicPr>
+          <p:cNvPr id="4" name="Picture 3"/>
+          <p:cNvPicPr>
+            <a:picLocks noChangeAspect="1"/>
+          </p:cNvPicPr>
+          <p:nvPr/>
+        </p:nvPicPr>
+        <p:blipFill>
+          <a:blip r:embed="rId2"/>
+          <a:stretch>
+            <a:fillRect/>
+          </a:stretch>
+        </p:blipFill>
+        <p:spPr>
+          <a:xfrm>
+            <a:off x="345989" y="1923019"/>
+            <a:ext cx="5259113" cy="1446256"/>
+          </a:xfrm>
+          <a:prstGeom prst="rect">
+            <a:avLst/>
+          </a:prstGeom>
+        </p:spPr>
+      </p:pic>
+      <p:pic>
+        <p:nvPicPr>
+          <p:cNvPr id="5" name="Picture 4"/>
+          <p:cNvPicPr>
+            <a:picLocks noChangeAspect="1"/>
+          </p:cNvPicPr>
+          <p:nvPr/>
+        </p:nvPicPr>
+        <p:blipFill>
+          <a:blip r:embed="rId3"/>
+          <a:stretch>
+            <a:fillRect/>
+          </a:stretch>
+        </p:blipFill>
+        <p:spPr>
+          <a:xfrm>
+            <a:off x="5947719" y="930681"/>
+            <a:ext cx="2463113" cy="3473266"/>
+          </a:xfrm>
+          <a:prstGeom prst="rect">
+            <a:avLst/>
+          </a:prstGeom>
+        </p:spPr>
+      </p:pic>
     </p:spTree>
     <p:extLst>
       <p:ext uri="{BB962C8B-B14F-4D97-AF65-F5344CB8AC3E}">
-        <p14:creationId xmlns:p14="http://schemas.microsoft.com/office/powerpoint/2010/main" val="2096944262"/>
+        <p14:creationId xmlns:p14="http://schemas.microsoft.com/office/powerpoint/2010/main" val="3733302843"/>
       </p:ext>
     </p:extLst>
   </p:cSld>
   <p:clrMapOvr>
     <a:masterClrMapping/>
   </p:clrMapOvr>
+  <p:timing>
+    <p:tnLst>
+      <p:par>
+        <p:cTn id="1" dur="indefinite" restart="never" nodeType="tmRoot">
+          <p:childTnLst>
+            <p:seq concurrent="1" nextAc="seek">
+              <p:cTn id="2" dur="indefinite" nodeType="mainSeq">
+                <p:childTnLst>
+                  <p:par>
+                    <p:cTn id="3" fill="hold">
+                      <p:stCondLst>
+                        <p:cond delay="indefinite"/>
+                      </p:stCondLst>
+                      <p:childTnLst>
+                        <p:par>
+                          <p:cTn id="4" fill="hold">
+                            <p:stCondLst>
+                              <p:cond delay="0"/>
+                            </p:stCondLst>
+                            <p:childTnLst>
+                              <p:par>
+                                <p:cTn id="5" presetID="10" presetClass="entr" presetSubtype="0" fill="hold" nodeType="clickEffect">
+                                  <p:stCondLst>
+                                    <p:cond delay="0"/>
+                                  </p:stCondLst>
+                                  <p:childTnLst>
+                                    <p:set>
+                                      <p:cBhvr>
+                                        <p:cTn id="6" dur="1" fill="hold">
+                                          <p:stCondLst>
+                                            <p:cond delay="0"/>
+                                          </p:stCondLst>
+                                        </p:cTn>
+                                        <p:tgtEl>
+                                          <p:spTgt spid="4"/>
+                                        </p:tgtEl>
+                                        <p:attrNameLst>
+                                          <p:attrName>style.visibility</p:attrName>
+                                        </p:attrNameLst>
+                                      </p:cBhvr>
+                                      <p:to>
+                                        <p:strVal val="visible"/>
+                                      </p:to>
+                                    </p:set>
+                                    <p:animEffect transition="in" filter="fade">
+                                      <p:cBhvr>
+                                        <p:cTn id="7" dur="500"/>
+                                        <p:tgtEl>
+                                          <p:spTgt spid="4"/>
+                                        </p:tgtEl>
+                                      </p:cBhvr>
+                                    </p:animEffect>
+                                  </p:childTnLst>
+                                </p:cTn>
+                              </p:par>
+                            </p:childTnLst>
+                          </p:cTn>
+                        </p:par>
+                      </p:childTnLst>
+                    </p:cTn>
+                  </p:par>
+                  <p:par>
+                    <p:cTn id="8" fill="hold">
+                      <p:stCondLst>
+                        <p:cond delay="indefinite"/>
+                      </p:stCondLst>
+                      <p:childTnLst>
+                        <p:par>
+                          <p:cTn id="9" fill="hold">
+                            <p:stCondLst>
+                              <p:cond delay="0"/>
+                            </p:stCondLst>
+                            <p:childTnLst>
+                              <p:par>
+                                <p:cTn id="10" presetID="22" presetClass="entr" presetSubtype="1" fill="hold" nodeType="clickEffect">
+                                  <p:stCondLst>
+                                    <p:cond delay="0"/>
+                                  </p:stCondLst>
+                                  <p:childTnLst>
+                                    <p:set>
+                                      <p:cBhvr>
+                                        <p:cTn id="11" dur="1" fill="hold">
+                                          <p:stCondLst>
+                                            <p:cond delay="0"/>
+                                          </p:stCondLst>
+                                        </p:cTn>
+                                        <p:tgtEl>
+                                          <p:spTgt spid="5"/>
+                                        </p:tgtEl>
+                                        <p:attrNameLst>
+                                          <p:attrName>style.visibility</p:attrName>
+                                        </p:attrNameLst>
+                                      </p:cBhvr>
+                                      <p:to>
+                                        <p:strVal val="visible"/>
+                                      </p:to>
+                                    </p:set>
+                                    <p:animEffect transition="in" filter="wipe(up)">
+                                      <p:cBhvr>
+                                        <p:cTn id="12" dur="500"/>
+                                        <p:tgtEl>
+                                          <p:spTgt spid="5"/>
+                                        </p:tgtEl>
+                                      </p:cBhvr>
+                                    </p:animEffect>
+                                  </p:childTnLst>
+                                </p:cTn>
+                              </p:par>
+                            </p:childTnLst>
+                          </p:cTn>
+                        </p:par>
+                      </p:childTnLst>
+                    </p:cTn>
+                  </p:par>
+                </p:childTnLst>
+              </p:cTn>
+              <p:prevCondLst>
+                <p:cond evt="onPrev" delay="0">
+                  <p:tgtEl>
+                    <p:sldTgt/>
+                  </p:tgtEl>
+                </p:cond>
+              </p:prevCondLst>
+              <p:nextCondLst>
+                <p:cond evt="onNext" delay="0">
+                  <p:tgtEl>
+                    <p:sldTgt/>
+                  </p:tgtEl>
+                </p:cond>
+              </p:nextCondLst>
+            </p:seq>
+          </p:childTnLst>
+        </p:cTn>
+      </p:par>
+    </p:tnLst>
+  </p:timing>
 </p:sld>
 </file>
 
@@ -6213,7 +6437,7 @@
           <a:p>
             <a:r>
               <a:rPr lang="en-US" dirty="0"/>
-              <a:t>Examples</a:t>
+              <a:t>Visitor (behavioral)</a:t>
             </a:r>
           </a:p>
         </p:txBody>
@@ -6228,19 +6452,75 @@
             <p:ph type="body" sz="quarter" idx="10"/>
           </p:nvPr>
         </p:nvSpPr>
-        <p:spPr/>
+        <p:spPr>
+          <a:xfrm>
+            <a:off x="107091" y="1047750"/>
+            <a:ext cx="8962767" cy="641007"/>
+          </a:xfrm>
+        </p:spPr>
         <p:txBody>
           <a:bodyPr/>
           <a:lstStyle/>
           <a:p>
-            <a:endParaRPr lang="en-US"/>
-          </a:p>
-        </p:txBody>
-      </p:sp>
+            <a:r>
+              <a:rPr lang="en-US" sz="1800" dirty="0"/>
+              <a:t>Represent an operation to be performed on different objects without changing the objects</a:t>
+            </a:r>
+          </a:p>
+        </p:txBody>
+      </p:sp>
+      <p:pic>
+        <p:nvPicPr>
+          <p:cNvPr id="4" name="Picture 3"/>
+          <p:cNvPicPr>
+            <a:picLocks noChangeAspect="1"/>
+          </p:cNvPicPr>
+          <p:nvPr/>
+        </p:nvPicPr>
+        <p:blipFill>
+          <a:blip r:embed="rId2"/>
+          <a:stretch>
+            <a:fillRect/>
+          </a:stretch>
+        </p:blipFill>
+        <p:spPr>
+          <a:xfrm>
+            <a:off x="6337337" y="1900482"/>
+            <a:ext cx="2419313" cy="2133367"/>
+          </a:xfrm>
+          <a:prstGeom prst="rect">
+            <a:avLst/>
+          </a:prstGeom>
+        </p:spPr>
+      </p:pic>
+      <p:pic>
+        <p:nvPicPr>
+          <p:cNvPr id="5" name="Picture 4"/>
+          <p:cNvPicPr>
+            <a:picLocks noChangeAspect="1"/>
+          </p:cNvPicPr>
+          <p:nvPr/>
+        </p:nvPicPr>
+        <p:blipFill>
+          <a:blip r:embed="rId3"/>
+          <a:stretch>
+            <a:fillRect/>
+          </a:stretch>
+        </p:blipFill>
+        <p:spPr>
+          <a:xfrm>
+            <a:off x="307826" y="2072682"/>
+            <a:ext cx="5546251" cy="1961167"/>
+          </a:xfrm>
+          <a:prstGeom prst="rect">
+            <a:avLst/>
+          </a:prstGeom>
+        </p:spPr>
+      </p:pic>
     </p:spTree>
     <p:extLst>
       <p:ext uri="{BB962C8B-B14F-4D97-AF65-F5344CB8AC3E}">
-        <p14:creationId xmlns:p14="http://schemas.microsoft.com/office/powerpoint/2010/main" val="829201321"/>
+        <p14:creationId xmlns:p14="http://schemas.microsoft.com/office/powerpoint/2010/main" val="2096944262"/>
       </p:ext>
     </p:extLst>
   </p:cSld>
@@ -6283,35 +6563,156 @@
           <a:lstStyle/>
           <a:p>
             <a:r>
-              <a:rPr lang="en-US" dirty="0"/>
-              <a:t>Resources</a:t>
-            </a:r>
-          </a:p>
-        </p:txBody>
-      </p:sp>
-      <p:sp>
-        <p:nvSpPr>
-          <p:cNvPr id="4" name="Text Placeholder 3"/>
-          <p:cNvSpPr>
-            <a:spLocks noGrp="1"/>
-          </p:cNvSpPr>
-          <p:nvPr>
-            <p:ph type="body" sz="quarter" idx="10"/>
-          </p:nvPr>
-        </p:nvSpPr>
-        <p:spPr/>
-        <p:txBody>
-          <a:bodyPr/>
-          <a:lstStyle/>
-          <a:p>
-            <a:endParaRPr lang="en-US"/>
-          </a:p>
-        </p:txBody>
-      </p:sp>
+              <a:rPr lang="en-CA" dirty="0"/>
+              <a:t>Visitor - example</a:t>
+            </a:r>
+          </a:p>
+        </p:txBody>
+      </p:sp>
+      <p:pic>
+        <p:nvPicPr>
+          <p:cNvPr id="4" name="Picture 3"/>
+          <p:cNvPicPr>
+            <a:picLocks noChangeAspect="1"/>
+          </p:cNvPicPr>
+          <p:nvPr/>
+        </p:nvPicPr>
+        <p:blipFill>
+          <a:blip r:embed="rId2"/>
+          <a:stretch>
+            <a:fillRect/>
+          </a:stretch>
+        </p:blipFill>
+        <p:spPr>
+          <a:xfrm>
+            <a:off x="6097115" y="945356"/>
+            <a:ext cx="2659535" cy="2391196"/>
+          </a:xfrm>
+          <a:prstGeom prst="rect">
+            <a:avLst/>
+          </a:prstGeom>
+        </p:spPr>
+      </p:pic>
+      <p:pic>
+        <p:nvPicPr>
+          <p:cNvPr id="5" name="Picture 4"/>
+          <p:cNvPicPr>
+            <a:picLocks noChangeAspect="1"/>
+          </p:cNvPicPr>
+          <p:nvPr/>
+        </p:nvPicPr>
+        <p:blipFill>
+          <a:blip r:embed="rId3"/>
+          <a:stretch>
+            <a:fillRect/>
+          </a:stretch>
+        </p:blipFill>
+        <p:spPr>
+          <a:xfrm>
+            <a:off x="769723" y="855830"/>
+            <a:ext cx="3324483" cy="2714372"/>
+          </a:xfrm>
+          <a:prstGeom prst="rect">
+            <a:avLst/>
+          </a:prstGeom>
+        </p:spPr>
+      </p:pic>
+      <p:pic>
+        <p:nvPicPr>
+          <p:cNvPr id="6" name="Picture 5"/>
+          <p:cNvPicPr>
+            <a:picLocks noChangeAspect="1"/>
+          </p:cNvPicPr>
+          <p:nvPr/>
+        </p:nvPicPr>
+        <p:blipFill>
+          <a:blip r:embed="rId4"/>
+          <a:stretch>
+            <a:fillRect/>
+          </a:stretch>
+        </p:blipFill>
+        <p:spPr>
+          <a:xfrm>
+            <a:off x="3187871" y="3336552"/>
+            <a:ext cx="2909244" cy="1015205"/>
+          </a:xfrm>
+          <a:prstGeom prst="rect">
+            <a:avLst/>
+          </a:prstGeom>
+        </p:spPr>
+      </p:pic>
+      <p:cxnSp>
+        <p:nvCxnSpPr>
+          <p:cNvPr id="8" name="Straight Arrow Connector 7"/>
+          <p:cNvCxnSpPr>
+            <a:cxnSpLocks/>
+          </p:cNvCxnSpPr>
+          <p:nvPr/>
+        </p:nvCxnSpPr>
+        <p:spPr>
+          <a:xfrm flipH="1">
+            <a:off x="5420497" y="2471351"/>
+            <a:ext cx="676619" cy="1466791"/>
+          </a:xfrm>
+          <a:prstGeom prst="straightConnector1">
+            <a:avLst/>
+          </a:prstGeom>
+          <a:ln>
+            <a:tailEnd type="triangle"/>
+          </a:ln>
+        </p:spPr>
+        <p:style>
+          <a:lnRef idx="2">
+            <a:schemeClr val="accent1"/>
+          </a:lnRef>
+          <a:fillRef idx="0">
+            <a:schemeClr val="accent1"/>
+          </a:fillRef>
+          <a:effectRef idx="1">
+            <a:schemeClr val="accent1"/>
+          </a:effectRef>
+          <a:fontRef idx="minor">
+            <a:schemeClr val="tx1"/>
+          </a:fontRef>
+        </p:style>
+      </p:cxnSp>
+      <p:cxnSp>
+        <p:nvCxnSpPr>
+          <p:cNvPr id="10" name="Straight Arrow Connector 9"/>
+          <p:cNvCxnSpPr/>
+          <p:nvPr/>
+        </p:nvCxnSpPr>
+        <p:spPr>
+          <a:xfrm>
+            <a:off x="2232454" y="2734962"/>
+            <a:ext cx="2018270" cy="963827"/>
+          </a:xfrm>
+          <a:prstGeom prst="straightConnector1">
+            <a:avLst/>
+          </a:prstGeom>
+          <a:ln>
+            <a:tailEnd type="triangle"/>
+          </a:ln>
+        </p:spPr>
+        <p:style>
+          <a:lnRef idx="2">
+            <a:schemeClr val="accent1"/>
+          </a:lnRef>
+          <a:fillRef idx="0">
+            <a:schemeClr val="accent1"/>
+          </a:fillRef>
+          <a:effectRef idx="1">
+            <a:schemeClr val="accent1"/>
+          </a:effectRef>
+          <a:fontRef idx="minor">
+            <a:schemeClr val="tx1"/>
+          </a:fontRef>
+        </p:style>
+      </p:cxnSp>
     </p:spTree>
     <p:extLst>
       <p:ext uri="{BB962C8B-B14F-4D97-AF65-F5344CB8AC3E}">
-        <p14:creationId xmlns:p14="http://schemas.microsoft.com/office/powerpoint/2010/main" val="2791484755"/>
+        <p14:creationId xmlns:p14="http://schemas.microsoft.com/office/powerpoint/2010/main" val="651878680"/>
       </p:ext>
     </p:extLst>
   </p:cSld>
@@ -6345,13 +6746,13 @@
             <a:spLocks noGrp="1"/>
           </p:cNvSpPr>
           <p:nvPr>
-            <p:ph type="ctrTitle"/>
-          </p:nvPr>
-        </p:nvSpPr>
-        <p:spPr>
-          <a:xfrm>
-            <a:off x="633334" y="1453277"/>
-            <a:ext cx="7772400" cy="1470025"/>
+            <p:ph type="title"/>
+          </p:nvPr>
+        </p:nvSpPr>
+        <p:spPr>
+          <a:xfrm>
+            <a:off x="406400" y="2098138"/>
+            <a:ext cx="8350250" cy="857250"/>
           </a:xfrm>
         </p:spPr>
         <p:txBody>
@@ -6360,8 +6761,8 @@
           <a:p>
             <a:pPr algn="ctr"/>
             <a:r>
-              <a:rPr lang="en-US" dirty="0"/>
-              <a:t>Exercises</a:t>
+              <a:rPr lang="en-CA" dirty="0"/>
+              <a:t>Q&amp;A</a:t>
             </a:r>
           </a:p>
         </p:txBody>
@@ -6369,7 +6770,7 @@
     </p:spTree>
     <p:extLst>
       <p:ext uri="{BB962C8B-B14F-4D97-AF65-F5344CB8AC3E}">
-        <p14:creationId xmlns:p14="http://schemas.microsoft.com/office/powerpoint/2010/main" val="2737262728"/>
+        <p14:creationId xmlns:p14="http://schemas.microsoft.com/office/powerpoint/2010/main" val="2045013666"/>
       </p:ext>
     </p:extLst>
   </p:cSld>
@@ -6413,14 +6814,14 @@
           <a:p>
             <a:r>
               <a:rPr lang="en-US" dirty="0"/>
-              <a:t>Part1 – Implement Library main engine</a:t>
-            </a:r>
-          </a:p>
-        </p:txBody>
-      </p:sp>
-      <p:sp>
-        <p:nvSpPr>
-          <p:cNvPr id="3" name="Text Placeholder 2"/>
+              <a:t>Resources</a:t>
+            </a:r>
+          </a:p>
+        </p:txBody>
+      </p:sp>
+      <p:sp>
+        <p:nvSpPr>
+          <p:cNvPr id="4" name="Text Placeholder 3"/>
           <p:cNvSpPr>
             <a:spLocks noGrp="1"/>
           </p:cNvSpPr>
@@ -6434,48 +6835,55 @@
           <a:lstStyle/>
           <a:p>
             <a:r>
-              <a:rPr lang="en-US" dirty="0"/>
-              <a:t>Given:</a:t>
-            </a:r>
-          </a:p>
-          <a:p>
-            <a:pPr lvl="1"/>
-            <a:r>
-              <a:rPr lang="en-US" dirty="0"/>
-              <a:t>main method which starts Library application</a:t>
-            </a:r>
-          </a:p>
-          <a:p>
-            <a:r>
-              <a:rPr lang="en-US" dirty="0"/>
-              <a:t>Task:</a:t>
-            </a:r>
-          </a:p>
-          <a:p>
-            <a:pPr lvl="1"/>
-            <a:r>
-              <a:rPr lang="en-US" dirty="0"/>
-              <a:t>Using </a:t>
-            </a:r>
-            <a:r>
-              <a:rPr lang="en-US" b="1" dirty="0">
-                <a:solidFill>
-                  <a:srgbClr val="FF0000"/>
-                </a:solidFill>
+              <a:rPr lang="en-US" dirty="0">
+                <a:hlinkClick r:id="rId2"/>
               </a:rPr>
-              <a:t>Singleton</a:t>
-            </a:r>
-            <a:r>
-              <a:rPr lang="en-US" dirty="0"/>
-              <a:t> pattern make sure the system will always run only one instance of library </a:t>
-            </a:r>
-          </a:p>
-        </p:txBody>
-      </p:sp>
+              <a:t>https://sourcemaking.com/design_patterns</a:t>
+            </a:r>
+            <a:endParaRPr lang="en-US" dirty="0"/>
+          </a:p>
+          <a:p>
+            <a:r>
+              <a:rPr lang="en-US" dirty="0">
+                <a:hlinkClick r:id="rId3"/>
+              </a:rPr>
+              <a:t>http://www.dofactory.com/net/design-patterns</a:t>
+            </a:r>
+            <a:endParaRPr lang="en-US" dirty="0"/>
+          </a:p>
+          <a:p>
+            <a:endParaRPr lang="en-US" dirty="0"/>
+          </a:p>
+        </p:txBody>
+      </p:sp>
+      <p:pic>
+        <p:nvPicPr>
+          <p:cNvPr id="3" name="Picture 2"/>
+          <p:cNvPicPr>
+            <a:picLocks noChangeAspect="1"/>
+          </p:cNvPicPr>
+          <p:nvPr/>
+        </p:nvPicPr>
+        <p:blipFill>
+          <a:blip r:embed="rId4"/>
+          <a:stretch>
+            <a:fillRect/>
+          </a:stretch>
+        </p:blipFill>
+        <p:spPr>
+          <a:xfrm>
+            <a:off x="1534037" y="2228335"/>
+            <a:ext cx="1547529" cy="2037835"/>
+          </a:xfrm>
+          <a:prstGeom prst="rect">
+            <a:avLst/>
+          </a:prstGeom>
+        </p:spPr>
+      </p:pic>
     </p:spTree>
     <p:extLst>
       <p:ext uri="{BB962C8B-B14F-4D97-AF65-F5344CB8AC3E}">
-        <p14:creationId xmlns:p14="http://schemas.microsoft.com/office/powerpoint/2010/main" val="4002076103"/>
+        <p14:creationId xmlns:p14="http://schemas.microsoft.com/office/powerpoint/2010/main" val="2791484755"/>
       </p:ext>
     </p:extLst>
   </p:cSld>
@@ -6509,6 +6917,170 @@
             <a:spLocks noGrp="1"/>
           </p:cNvSpPr>
           <p:nvPr>
+            <p:ph type="ctrTitle"/>
+          </p:nvPr>
+        </p:nvSpPr>
+        <p:spPr>
+          <a:xfrm>
+            <a:off x="633334" y="1453277"/>
+            <a:ext cx="7772400" cy="1470025"/>
+          </a:xfrm>
+        </p:spPr>
+        <p:txBody>
+          <a:bodyPr/>
+          <a:lstStyle/>
+          <a:p>
+            <a:pPr algn="ctr"/>
+            <a:r>
+              <a:rPr lang="en-US" dirty="0"/>
+              <a:t>Exercises</a:t>
+            </a:r>
+          </a:p>
+        </p:txBody>
+      </p:sp>
+    </p:spTree>
+    <p:extLst>
+      <p:ext uri="{BB962C8B-B14F-4D97-AF65-F5344CB8AC3E}">
+        <p14:creationId xmlns:p14="http://schemas.microsoft.com/office/powerpoint/2010/main" val="2737262728"/>
+      </p:ext>
+    </p:extLst>
+  </p:cSld>
+  <p:clrMapOvr>
+    <a:masterClrMapping/>
+  </p:clrMapOvr>
+</p:sld>
+</file>
+
+<file path=ppt/slides/slide17.xml><?xml version="1.0" encoding="utf-8"?>
+<p:sld xmlns:a="http://schemas.openxmlformats.org/drawingml/2006/main" xmlns:r="http://schemas.openxmlformats.org/officeDocument/2006/relationships" xmlns:p="http://schemas.openxmlformats.org/presentationml/2006/main">
+  <p:cSld>
+    <p:spTree>
+      <p:nvGrpSpPr>
+        <p:cNvPr id="1" name=""/>
+        <p:cNvGrpSpPr/>
+        <p:nvPr/>
+      </p:nvGrpSpPr>
+      <p:grpSpPr>
+        <a:xfrm>
+          <a:off x="0" y="0"/>
+          <a:ext cx="0" cy="0"/>
+          <a:chOff x="0" y="0"/>
+          <a:chExt cx="0" cy="0"/>
+        </a:xfrm>
+      </p:grpSpPr>
+      <p:sp>
+        <p:nvSpPr>
+          <p:cNvPr id="2" name="Title 1"/>
+          <p:cNvSpPr>
+            <a:spLocks noGrp="1"/>
+          </p:cNvSpPr>
+          <p:nvPr>
+            <p:ph type="title"/>
+          </p:nvPr>
+        </p:nvSpPr>
+        <p:spPr/>
+        <p:txBody>
+          <a:bodyPr/>
+          <a:lstStyle/>
+          <a:p>
+            <a:r>
+              <a:rPr lang="en-US" dirty="0"/>
+              <a:t>Part1 – Implement Library main engine</a:t>
+            </a:r>
+          </a:p>
+        </p:txBody>
+      </p:sp>
+      <p:sp>
+        <p:nvSpPr>
+          <p:cNvPr id="3" name="Text Placeholder 2"/>
+          <p:cNvSpPr>
+            <a:spLocks noGrp="1"/>
+          </p:cNvSpPr>
+          <p:nvPr>
+            <p:ph type="body" sz="quarter" idx="10"/>
+          </p:nvPr>
+        </p:nvSpPr>
+        <p:spPr/>
+        <p:txBody>
+          <a:bodyPr/>
+          <a:lstStyle/>
+          <a:p>
+            <a:r>
+              <a:rPr lang="en-US" dirty="0"/>
+              <a:t>Given:</a:t>
+            </a:r>
+          </a:p>
+          <a:p>
+            <a:pPr lvl="1"/>
+            <a:r>
+              <a:rPr lang="en-US" dirty="0"/>
+              <a:t>main method which starts Library application</a:t>
+            </a:r>
+          </a:p>
+          <a:p>
+            <a:r>
+              <a:rPr lang="en-US" dirty="0"/>
+              <a:t>Task:</a:t>
+            </a:r>
+          </a:p>
+          <a:p>
+            <a:pPr lvl="1"/>
+            <a:r>
+              <a:rPr lang="en-US" dirty="0"/>
+              <a:t>Using </a:t>
+            </a:r>
+            <a:r>
+              <a:rPr lang="en-US" b="1" dirty="0">
+                <a:solidFill>
+                  <a:srgbClr val="FF0000"/>
+                </a:solidFill>
+              </a:rPr>
+              <a:t>Singleton</a:t>
+            </a:r>
+            <a:r>
+              <a:rPr lang="en-US" dirty="0"/>
+              <a:t> pattern make sure the system will always run only one instance of library </a:t>
+            </a:r>
+          </a:p>
+        </p:txBody>
+      </p:sp>
+    </p:spTree>
+    <p:extLst>
+      <p:ext uri="{BB962C8B-B14F-4D97-AF65-F5344CB8AC3E}">
+        <p14:creationId xmlns:p14="http://schemas.microsoft.com/office/powerpoint/2010/main" val="4002076103"/>
+      </p:ext>
+    </p:extLst>
+  </p:cSld>
+  <p:clrMapOvr>
+    <a:masterClrMapping/>
+  </p:clrMapOvr>
+</p:sld>
+</file>
+
+<file path=ppt/slides/slide18.xml><?xml version="1.0" encoding="utf-8"?>
+<p:sld xmlns:a="http://schemas.openxmlformats.org/drawingml/2006/main" xmlns:r="http://schemas.openxmlformats.org/officeDocument/2006/relationships" xmlns:p="http://schemas.openxmlformats.org/presentationml/2006/main">
+  <p:cSld>
+    <p:spTree>
+      <p:nvGrpSpPr>
+        <p:cNvPr id="1" name=""/>
+        <p:cNvGrpSpPr/>
+        <p:nvPr/>
+      </p:nvGrpSpPr>
+      <p:grpSpPr>
+        <a:xfrm>
+          <a:off x="0" y="0"/>
+          <a:ext cx="0" cy="0"/>
+          <a:chOff x="0" y="0"/>
+          <a:chExt cx="0" cy="0"/>
+        </a:xfrm>
+      </p:grpSpPr>
+      <p:sp>
+        <p:nvSpPr>
+          <p:cNvPr id="2" name="Title 1"/>
+          <p:cNvSpPr>
+            <a:spLocks noGrp="1"/>
+          </p:cNvSpPr>
+          <p:nvPr>
             <p:ph type="title"/>
           </p:nvPr>
         </p:nvSpPr>
@@ -6613,7 +7185,7 @@
 </p:sld>
 </file>
 
-<file path=ppt/slides/slide17.xml><?xml version="1.0" encoding="utf-8"?>
+<file path=ppt/slides/slide19.xml><?xml version="1.0" encoding="utf-8"?>
 <p:sld xmlns:a="http://schemas.openxmlformats.org/drawingml/2006/main" xmlns:r="http://schemas.openxmlformats.org/officeDocument/2006/relationships" xmlns:p="http://schemas.openxmlformats.org/presentationml/2006/main">
   <p:cSld>
     <p:spTree>
@@ -7064,8 +7636,32 @@
         </p:blipFill>
         <p:spPr>
           <a:xfrm>
-            <a:off x="406400" y="1836757"/>
+            <a:off x="295648" y="1765594"/>
             <a:ext cx="3621545" cy="2154334"/>
+          </a:xfrm>
+          <a:prstGeom prst="rect">
+            <a:avLst/>
+          </a:prstGeom>
+        </p:spPr>
+      </p:pic>
+      <p:pic>
+        <p:nvPicPr>
+          <p:cNvPr id="4" name="Picture 3"/>
+          <p:cNvPicPr>
+            <a:picLocks noChangeAspect="1"/>
+          </p:cNvPicPr>
+          <p:nvPr/>
+        </p:nvPicPr>
+        <p:blipFill>
+          <a:blip r:embed="rId5"/>
+          <a:stretch>
+            <a:fillRect/>
+          </a:stretch>
+        </p:blipFill>
+        <p:spPr>
+          <a:xfrm>
+            <a:off x="406400" y="2352024"/>
+            <a:ext cx="946463" cy="666886"/>
           </a:xfrm>
           <a:prstGeom prst="rect">
             <a:avLst/>
@@ -7538,14 +8134,14 @@
           <a:p>
             <a:r>
               <a:rPr lang="en-US" sz="1800" dirty="0"/>
-              <a:t>Object which acts as creator of other objects</a:t>
+              <a:t>Object which acts as creator of other objects implementing same interface</a:t>
             </a:r>
           </a:p>
         </p:txBody>
       </p:sp>
       <p:pic>
         <p:nvPicPr>
-          <p:cNvPr id="4" name="Picture 3"/>
+          <p:cNvPr id="6" name="Picture 5"/>
           <p:cNvPicPr>
             <a:picLocks noChangeAspect="1"/>
           </p:cNvPicPr>
@@ -7559,8 +8155,32 @@
         </p:blipFill>
         <p:spPr>
           <a:xfrm>
-            <a:off x="4919329" y="2259969"/>
-            <a:ext cx="3903589" cy="1411808"/>
+            <a:off x="4118810" y="2101969"/>
+            <a:ext cx="4524120" cy="1233484"/>
+          </a:xfrm>
+          <a:prstGeom prst="rect">
+            <a:avLst/>
+          </a:prstGeom>
+        </p:spPr>
+      </p:pic>
+      <p:pic>
+        <p:nvPicPr>
+          <p:cNvPr id="7" name="Picture 6"/>
+          <p:cNvPicPr>
+            <a:picLocks noChangeAspect="1"/>
+          </p:cNvPicPr>
+          <p:nvPr/>
+        </p:nvPicPr>
+        <p:blipFill>
+          <a:blip r:embed="rId3"/>
+          <a:stretch>
+            <a:fillRect/>
+          </a:stretch>
+        </p:blipFill>
+        <p:spPr>
+          <a:xfrm>
+            <a:off x="463550" y="1446074"/>
+            <a:ext cx="3267394" cy="3024326"/>
           </a:xfrm>
           <a:prstGeom prst="rect">
             <a:avLst/>
@@ -7614,7 +8234,7 @@
           <a:p>
             <a:r>
               <a:rPr lang="en-US" dirty="0"/>
-              <a:t>Adapter (structural)</a:t>
+              <a:t>Bridge (structural)</a:t>
             </a:r>
           </a:p>
         </p:txBody>
@@ -7634,14 +8254,47 @@
           <a:bodyPr/>
           <a:lstStyle/>
           <a:p>
-            <a:endParaRPr lang="en-US" dirty="0"/>
-          </a:p>
-        </p:txBody>
-      </p:sp>
+            <a:r>
+              <a:rPr lang="en-US" dirty="0"/>
+              <a:t>Enables use of different APIs by same type of object</a:t>
+            </a:r>
+          </a:p>
+          <a:p>
+            <a:r>
+              <a:rPr lang="en-US" dirty="0"/>
+              <a:t>Works like “API injector”</a:t>
+            </a:r>
+          </a:p>
+        </p:txBody>
+      </p:sp>
+      <p:pic>
+        <p:nvPicPr>
+          <p:cNvPr id="4" name="Picture 3"/>
+          <p:cNvPicPr>
+            <a:picLocks noChangeAspect="1"/>
+          </p:cNvPicPr>
+          <p:nvPr/>
+        </p:nvPicPr>
+        <p:blipFill>
+          <a:blip r:embed="rId2"/>
+          <a:stretch>
+            <a:fillRect/>
+          </a:stretch>
+        </p:blipFill>
+        <p:spPr>
+          <a:xfrm>
+            <a:off x="1442036" y="2403430"/>
+            <a:ext cx="6655946" cy="1799083"/>
+          </a:xfrm>
+          <a:prstGeom prst="rect">
+            <a:avLst/>
+          </a:prstGeom>
+        </p:spPr>
+      </p:pic>
     </p:spTree>
     <p:extLst>
       <p:ext uri="{BB962C8B-B14F-4D97-AF65-F5344CB8AC3E}">
-        <p14:creationId xmlns:p14="http://schemas.microsoft.com/office/powerpoint/2010/main" val="4001001577"/>
+        <p14:creationId xmlns:p14="http://schemas.microsoft.com/office/powerpoint/2010/main" val="1497040954"/>
       </p:ext>
     </p:extLst>
   </p:cSld>
@@ -7684,44 +8337,211 @@
           <a:lstStyle/>
           <a:p>
             <a:r>
-              <a:rPr lang="en-US" dirty="0"/>
-              <a:t>Bridge (structural)</a:t>
-            </a:r>
-          </a:p>
-        </p:txBody>
-      </p:sp>
-      <p:sp>
-        <p:nvSpPr>
-          <p:cNvPr id="3" name="Text Placeholder 2"/>
-          <p:cNvSpPr>
-            <a:spLocks noGrp="1"/>
-          </p:cNvSpPr>
-          <p:nvPr>
-            <p:ph type="body" sz="quarter" idx="10"/>
-          </p:nvPr>
-        </p:nvSpPr>
-        <p:spPr/>
-        <p:txBody>
-          <a:bodyPr/>
-          <a:lstStyle/>
-          <a:p>
-            <a:r>
-              <a:rPr lang="en-US" dirty="0"/>
-              <a:t>Enables use of different APIs by same type of object</a:t>
-            </a:r>
-          </a:p>
-          <a:p>
-            <a:r>
-              <a:rPr lang="en-US" dirty="0"/>
-              <a:t>Works like “API injector”</a:t>
-            </a:r>
-          </a:p>
-        </p:txBody>
-      </p:sp>
+              <a:rPr lang="en-CA" dirty="0"/>
+              <a:t>Bridge – practical example</a:t>
+            </a:r>
+          </a:p>
+        </p:txBody>
+      </p:sp>
+      <p:pic>
+        <p:nvPicPr>
+          <p:cNvPr id="4" name="Picture 3"/>
+          <p:cNvPicPr>
+            <a:picLocks noChangeAspect="1"/>
+          </p:cNvPicPr>
+          <p:nvPr/>
+        </p:nvPicPr>
+        <p:blipFill>
+          <a:blip r:embed="rId2"/>
+          <a:stretch>
+            <a:fillRect/>
+          </a:stretch>
+        </p:blipFill>
+        <p:spPr>
+          <a:xfrm>
+            <a:off x="5181375" y="1116173"/>
+            <a:ext cx="3178856" cy="701353"/>
+          </a:xfrm>
+          <a:prstGeom prst="rect">
+            <a:avLst/>
+          </a:prstGeom>
+          <a:effectLst>
+            <a:glow rad="127000">
+              <a:schemeClr val="accent1">
+                <a:lumMod val="20000"/>
+                <a:lumOff val="80000"/>
+              </a:schemeClr>
+            </a:glow>
+          </a:effectLst>
+        </p:spPr>
+      </p:pic>
+      <p:pic>
+        <p:nvPicPr>
+          <p:cNvPr id="6" name="Picture 5"/>
+          <p:cNvPicPr>
+            <a:picLocks noChangeAspect="1"/>
+          </p:cNvPicPr>
+          <p:nvPr/>
+        </p:nvPicPr>
+        <p:blipFill>
+          <a:blip r:embed="rId3"/>
+          <a:stretch>
+            <a:fillRect/>
+          </a:stretch>
+        </p:blipFill>
+        <p:spPr>
+          <a:xfrm>
+            <a:off x="4455489" y="2880946"/>
+            <a:ext cx="2134552" cy="958083"/>
+          </a:xfrm>
+          <a:prstGeom prst="rect">
+            <a:avLst/>
+          </a:prstGeom>
+          <a:effectLst>
+            <a:glow rad="127000">
+              <a:schemeClr val="accent1">
+                <a:lumMod val="20000"/>
+                <a:lumOff val="80000"/>
+              </a:schemeClr>
+            </a:glow>
+          </a:effectLst>
+        </p:spPr>
+      </p:pic>
+      <p:pic>
+        <p:nvPicPr>
+          <p:cNvPr id="7" name="Picture 6"/>
+          <p:cNvPicPr>
+            <a:picLocks noChangeAspect="1"/>
+          </p:cNvPicPr>
+          <p:nvPr/>
+        </p:nvPicPr>
+        <p:blipFill>
+          <a:blip r:embed="rId4"/>
+          <a:stretch>
+            <a:fillRect/>
+          </a:stretch>
+        </p:blipFill>
+        <p:spPr>
+          <a:xfrm>
+            <a:off x="6679156" y="2997060"/>
+            <a:ext cx="2359027" cy="725854"/>
+          </a:xfrm>
+          <a:prstGeom prst="rect">
+            <a:avLst/>
+          </a:prstGeom>
+          <a:effectLst>
+            <a:glow rad="127000">
+              <a:schemeClr val="accent1">
+                <a:lumMod val="20000"/>
+                <a:lumOff val="80000"/>
+              </a:schemeClr>
+            </a:glow>
+          </a:effectLst>
+        </p:spPr>
+      </p:pic>
+      <p:pic>
+        <p:nvPicPr>
+          <p:cNvPr id="8" name="Picture 7"/>
+          <p:cNvPicPr>
+            <a:picLocks noChangeAspect="1"/>
+          </p:cNvPicPr>
+          <p:nvPr/>
+        </p:nvPicPr>
+        <p:blipFill>
+          <a:blip r:embed="rId5"/>
+          <a:stretch>
+            <a:fillRect/>
+          </a:stretch>
+        </p:blipFill>
+        <p:spPr>
+          <a:xfrm>
+            <a:off x="778319" y="1070839"/>
+            <a:ext cx="1929730" cy="1117869"/>
+          </a:xfrm>
+          <a:prstGeom prst="rect">
+            <a:avLst/>
+          </a:prstGeom>
+          <a:effectLst>
+            <a:glow rad="127000">
+              <a:schemeClr val="accent1">
+                <a:lumMod val="20000"/>
+                <a:lumOff val="80000"/>
+              </a:schemeClr>
+            </a:glow>
+          </a:effectLst>
+        </p:spPr>
+      </p:pic>
+      <p:pic>
+        <p:nvPicPr>
+          <p:cNvPr id="9" name="Picture 8"/>
+          <p:cNvPicPr>
+            <a:picLocks noChangeAspect="1"/>
+          </p:cNvPicPr>
+          <p:nvPr/>
+        </p:nvPicPr>
+        <p:blipFill>
+          <a:blip r:embed="rId6"/>
+          <a:stretch>
+            <a:fillRect/>
+          </a:stretch>
+        </p:blipFill>
+        <p:spPr>
+          <a:xfrm>
+            <a:off x="485533" y="2689698"/>
+            <a:ext cx="3319205" cy="1577502"/>
+          </a:xfrm>
+          <a:prstGeom prst="rect">
+            <a:avLst/>
+          </a:prstGeom>
+          <a:effectLst>
+            <a:glow rad="127000">
+              <a:schemeClr val="accent1">
+                <a:lumMod val="20000"/>
+                <a:lumOff val="80000"/>
+              </a:schemeClr>
+            </a:glow>
+          </a:effectLst>
+        </p:spPr>
+      </p:pic>
+      <p:pic>
+        <p:nvPicPr>
+          <p:cNvPr id="10" name="Picture 9"/>
+          <p:cNvPicPr>
+            <a:picLocks noChangeAspect="1"/>
+          </p:cNvPicPr>
+          <p:nvPr/>
+        </p:nvPicPr>
+        <p:blipFill>
+          <a:blip r:embed="rId7">
+            <a:lum bright="-4000"/>
+          </a:blip>
+          <a:stretch>
+            <a:fillRect/>
+          </a:stretch>
+        </p:blipFill>
+        <p:spPr>
+          <a:xfrm>
+            <a:off x="3106848" y="1990880"/>
+            <a:ext cx="1879488" cy="508020"/>
+          </a:xfrm>
+          <a:prstGeom prst="rect">
+            <a:avLst/>
+          </a:prstGeom>
+          <a:effectLst>
+            <a:glow rad="101600">
+              <a:schemeClr val="accent1">
+                <a:lumMod val="20000"/>
+                <a:lumOff val="80000"/>
+                <a:alpha val="40000"/>
+              </a:schemeClr>
+            </a:glow>
+          </a:effectLst>
+        </p:spPr>
+      </p:pic>
     </p:spTree>
     <p:extLst>
       <p:ext uri="{BB962C8B-B14F-4D97-AF65-F5344CB8AC3E}">
-        <p14:creationId xmlns:p14="http://schemas.microsoft.com/office/powerpoint/2010/main" val="1497040954"/>
+        <p14:creationId xmlns:p14="http://schemas.microsoft.com/office/powerpoint/2010/main" val="3175472840"/>
       </p:ext>
     </p:extLst>
   </p:cSld>

</xml_diff>

<commit_message>
borrowable book final , github quck start added
</commit_message>
<xml_diff>
--- a/Presentation/Design Patterns Official.pptx
+++ b/Presentation/Design Patterns Official.pptx
@@ -6222,7 +6222,7 @@
         </p:blipFill>
         <p:spPr>
           <a:xfrm>
-            <a:off x="345989" y="1923019"/>
+            <a:off x="3570038" y="2096440"/>
             <a:ext cx="5259113" cy="1446256"/>
           </a:xfrm>
           <a:prstGeom prst="rect">
@@ -6246,7 +6246,7 @@
         </p:blipFill>
         <p:spPr>
           <a:xfrm>
-            <a:off x="5947719" y="930681"/>
+            <a:off x="823926" y="945356"/>
             <a:ext cx="2463113" cy="3473266"/>
           </a:xfrm>
           <a:prstGeom prst="rect">
@@ -6285,7 +6285,7 @@
                             </p:stCondLst>
                             <p:childTnLst>
                               <p:par>
-                                <p:cTn id="5" presetID="10" presetClass="entr" presetSubtype="0" fill="hold" nodeType="clickEffect">
+                                <p:cTn id="5" presetID="22" presetClass="entr" presetSubtype="1" fill="hold" nodeType="clickEffect">
                                   <p:stCondLst>
                                     <p:cond delay="0"/>
                                   </p:stCondLst>
@@ -6298,7 +6298,7 @@
                                           </p:stCondLst>
                                         </p:cTn>
                                         <p:tgtEl>
-                                          <p:spTgt spid="4"/>
+                                          <p:spTgt spid="5"/>
                                         </p:tgtEl>
                                         <p:attrNameLst>
                                           <p:attrName>style.visibility</p:attrName>
@@ -6308,11 +6308,11 @@
                                         <p:strVal val="visible"/>
                                       </p:to>
                                     </p:set>
-                                    <p:animEffect transition="in" filter="fade">
+                                    <p:animEffect transition="in" filter="wipe(up)">
                                       <p:cBhvr>
                                         <p:cTn id="7" dur="500"/>
                                         <p:tgtEl>
-                                          <p:spTgt spid="4"/>
+                                          <p:spTgt spid="5"/>
                                         </p:tgtEl>
                                       </p:cBhvr>
                                     </p:animEffect>
@@ -6338,7 +6338,7 @@
                             </p:stCondLst>
                             <p:childTnLst>
                               <p:par>
-                                <p:cTn id="10" presetID="22" presetClass="entr" presetSubtype="1" fill="hold" nodeType="clickEffect">
+                                <p:cTn id="10" presetID="10" presetClass="entr" presetSubtype="0" fill="hold" nodeType="clickEffect">
                                   <p:stCondLst>
                                     <p:cond delay="0"/>
                                   </p:stCondLst>
@@ -6351,7 +6351,7 @@
                                           </p:stCondLst>
                                         </p:cTn>
                                         <p:tgtEl>
-                                          <p:spTgt spid="5"/>
+                                          <p:spTgt spid="4"/>
                                         </p:tgtEl>
                                         <p:attrNameLst>
                                           <p:attrName>style.visibility</p:attrName>
@@ -6361,11 +6361,11 @@
                                         <p:strVal val="visible"/>
                                       </p:to>
                                     </p:set>
-                                    <p:animEffect transition="in" filter="wipe(up)">
+                                    <p:animEffect transition="in" filter="fade">
                                       <p:cBhvr>
                                         <p:cTn id="12" dur="500"/>
                                         <p:tgtEl>
-                                          <p:spTgt spid="5"/>
+                                          <p:spTgt spid="4"/>
                                         </p:tgtEl>
                                       </p:cBhvr>
                                     </p:animEffect>
@@ -7301,7 +7301,15 @@
             </a:r>
             <a:r>
               <a:rPr lang="en-US" dirty="0"/>
-              <a:t> pattern implement Borrowable class that enables to borrow a book from the library.</a:t>
+              <a:t> pattern implement </a:t>
+            </a:r>
+            <a:r>
+              <a:rPr lang="en-US"/>
+              <a:t>BookBorrowable </a:t>
+            </a:r>
+            <a:r>
+              <a:rPr lang="en-US" dirty="0"/>
+              <a:t>class that enables to borrow a book from the library.</a:t>
             </a:r>
           </a:p>
           <a:p>

</xml_diff>